<commit_message>
Update 20221024_BR MA Thesis Presentation.pptx
</commit_message>
<xml_diff>
--- a/Presentation/20221024_BR MA Thesis Presentation.pptx
+++ b/Presentation/20221024_BR MA Thesis Presentation.pptx
@@ -219,7 +219,7 @@
           <a:p>
             <a:fld id="{2101BADC-E581-4D9C-B16A-30CB37D5EF28}" type="datetimeFigureOut">
               <a:rPr lang="de-CH" smtClean="0"/>
-              <a:t>31.10.2022</a:t>
+              <a:t>01.11.2022</a:t>
             </a:fld>
             <a:endParaRPr lang="de-CH"/>
           </a:p>
@@ -895,7 +895,7 @@
           <a:p>
             <a:fld id="{72079F36-2327-43E4-B4FA-2AA4C52F31C5}" type="datetimeFigureOut">
               <a:rPr lang="de-CH" smtClean="0"/>
-              <a:t>30.10.2022</a:t>
+              <a:t>01.11.2022</a:t>
             </a:fld>
             <a:endParaRPr lang="de-CH"/>
           </a:p>
@@ -1095,7 +1095,7 @@
           <a:p>
             <a:fld id="{72079F36-2327-43E4-B4FA-2AA4C52F31C5}" type="datetimeFigureOut">
               <a:rPr lang="de-CH" smtClean="0"/>
-              <a:t>30.10.2022</a:t>
+              <a:t>01.11.2022</a:t>
             </a:fld>
             <a:endParaRPr lang="de-CH"/>
           </a:p>
@@ -1305,7 +1305,7 @@
           <a:p>
             <a:fld id="{72079F36-2327-43E4-B4FA-2AA4C52F31C5}" type="datetimeFigureOut">
               <a:rPr lang="de-CH" smtClean="0"/>
-              <a:t>30.10.2022</a:t>
+              <a:t>01.11.2022</a:t>
             </a:fld>
             <a:endParaRPr lang="de-CH"/>
           </a:p>
@@ -1505,7 +1505,7 @@
           <a:p>
             <a:fld id="{72079F36-2327-43E4-B4FA-2AA4C52F31C5}" type="datetimeFigureOut">
               <a:rPr lang="de-CH" smtClean="0"/>
-              <a:t>30.10.2022</a:t>
+              <a:t>01.11.2022</a:t>
             </a:fld>
             <a:endParaRPr lang="de-CH"/>
           </a:p>
@@ -1781,7 +1781,7 @@
           <a:p>
             <a:fld id="{72079F36-2327-43E4-B4FA-2AA4C52F31C5}" type="datetimeFigureOut">
               <a:rPr lang="de-CH" smtClean="0"/>
-              <a:t>30.10.2022</a:t>
+              <a:t>01.11.2022</a:t>
             </a:fld>
             <a:endParaRPr lang="de-CH"/>
           </a:p>
@@ -2049,7 +2049,7 @@
           <a:p>
             <a:fld id="{72079F36-2327-43E4-B4FA-2AA4C52F31C5}" type="datetimeFigureOut">
               <a:rPr lang="de-CH" smtClean="0"/>
-              <a:t>30.10.2022</a:t>
+              <a:t>01.11.2022</a:t>
             </a:fld>
             <a:endParaRPr lang="de-CH"/>
           </a:p>
@@ -2464,7 +2464,7 @@
           <a:p>
             <a:fld id="{72079F36-2327-43E4-B4FA-2AA4C52F31C5}" type="datetimeFigureOut">
               <a:rPr lang="de-CH" smtClean="0"/>
-              <a:t>30.10.2022</a:t>
+              <a:t>01.11.2022</a:t>
             </a:fld>
             <a:endParaRPr lang="de-CH"/>
           </a:p>
@@ -2606,7 +2606,7 @@
           <a:p>
             <a:fld id="{72079F36-2327-43E4-B4FA-2AA4C52F31C5}" type="datetimeFigureOut">
               <a:rPr lang="de-CH" smtClean="0"/>
-              <a:t>30.10.2022</a:t>
+              <a:t>01.11.2022</a:t>
             </a:fld>
             <a:endParaRPr lang="de-CH"/>
           </a:p>
@@ -2719,7 +2719,7 @@
           <a:p>
             <a:fld id="{72079F36-2327-43E4-B4FA-2AA4C52F31C5}" type="datetimeFigureOut">
               <a:rPr lang="de-CH" smtClean="0"/>
-              <a:t>30.10.2022</a:t>
+              <a:t>01.11.2022</a:t>
             </a:fld>
             <a:endParaRPr lang="de-CH"/>
           </a:p>
@@ -3032,7 +3032,7 @@
           <a:p>
             <a:fld id="{72079F36-2327-43E4-B4FA-2AA4C52F31C5}" type="datetimeFigureOut">
               <a:rPr lang="de-CH" smtClean="0"/>
-              <a:t>30.10.2022</a:t>
+              <a:t>01.11.2022</a:t>
             </a:fld>
             <a:endParaRPr lang="de-CH"/>
           </a:p>
@@ -3321,7 +3321,7 @@
           <a:p>
             <a:fld id="{72079F36-2327-43E4-B4FA-2AA4C52F31C5}" type="datetimeFigureOut">
               <a:rPr lang="de-CH" smtClean="0"/>
-              <a:t>30.10.2022</a:t>
+              <a:t>01.11.2022</a:t>
             </a:fld>
             <a:endParaRPr lang="de-CH"/>
           </a:p>
@@ -3616,7 +3616,7 @@
             <a:fld id="{72079F36-2327-43E4-B4FA-2AA4C52F31C5}" type="datetimeFigureOut">
               <a:rPr lang="de-CH" smtClean="0"/>
               <a:pPr/>
-              <a:t>30.10.2022</a:t>
+              <a:t>01.11.2022</a:t>
             </a:fld>
             <a:endParaRPr lang="de-CH"/>
           </a:p>
@@ -12581,7 +12581,7 @@
             <p:nvPr/>
           </p:nvSpPr>
           <p:spPr>
-            <a:xfrm>
+            <a:xfrm rot="10800000">
               <a:off x="2249424" y="2354362"/>
               <a:ext cx="310896" cy="307777"/>
             </a:xfrm>
@@ -12591,15 +12591,15 @@
           </p:spPr>
           <p:style>
             <a:lnRef idx="2">
-              <a:schemeClr val="accent3">
+              <a:schemeClr val="accent6">
                 <a:shade val="50000"/>
               </a:schemeClr>
             </a:lnRef>
             <a:fillRef idx="1">
-              <a:schemeClr val="accent3"/>
+              <a:schemeClr val="accent6"/>
             </a:fillRef>
             <a:effectRef idx="0">
-              <a:schemeClr val="accent3"/>
+              <a:schemeClr val="accent6"/>
             </a:effectRef>
             <a:fontRef idx="minor">
               <a:schemeClr val="lt1"/>
@@ -12610,7 +12610,7 @@
             <a:lstStyle/>
             <a:p>
               <a:pPr algn="ctr"/>
-              <a:endParaRPr lang="de-CH"/>
+              <a:endParaRPr lang="de-CH" dirty="0"/>
             </a:p>
           </p:txBody>
         </p:sp>

</xml_diff>

<commit_message>
changed visuals output to svg // added new file for appendix
</commit_message>
<xml_diff>
--- a/Presentation/20221024_BR MA Thesis Presentation.pptx
+++ b/Presentation/20221024_BR MA Thesis Presentation.pptx
@@ -219,7 +219,7 @@
           <a:p>
             <a:fld id="{2101BADC-E581-4D9C-B16A-30CB37D5EF28}" type="datetimeFigureOut">
               <a:rPr lang="de-CH" smtClean="0"/>
-              <a:t>01.11.2022</a:t>
+              <a:t>08.11.2022</a:t>
             </a:fld>
             <a:endParaRPr lang="de-CH"/>
           </a:p>
@@ -895,7 +895,7 @@
           <a:p>
             <a:fld id="{72079F36-2327-43E4-B4FA-2AA4C52F31C5}" type="datetimeFigureOut">
               <a:rPr lang="de-CH" smtClean="0"/>
-              <a:t>01.11.2022</a:t>
+              <a:t>08.11.2022</a:t>
             </a:fld>
             <a:endParaRPr lang="de-CH"/>
           </a:p>
@@ -1095,7 +1095,7 @@
           <a:p>
             <a:fld id="{72079F36-2327-43E4-B4FA-2AA4C52F31C5}" type="datetimeFigureOut">
               <a:rPr lang="de-CH" smtClean="0"/>
-              <a:t>01.11.2022</a:t>
+              <a:t>08.11.2022</a:t>
             </a:fld>
             <a:endParaRPr lang="de-CH"/>
           </a:p>
@@ -1305,7 +1305,7 @@
           <a:p>
             <a:fld id="{72079F36-2327-43E4-B4FA-2AA4C52F31C5}" type="datetimeFigureOut">
               <a:rPr lang="de-CH" smtClean="0"/>
-              <a:t>01.11.2022</a:t>
+              <a:t>08.11.2022</a:t>
             </a:fld>
             <a:endParaRPr lang="de-CH"/>
           </a:p>
@@ -1505,7 +1505,7 @@
           <a:p>
             <a:fld id="{72079F36-2327-43E4-B4FA-2AA4C52F31C5}" type="datetimeFigureOut">
               <a:rPr lang="de-CH" smtClean="0"/>
-              <a:t>01.11.2022</a:t>
+              <a:t>08.11.2022</a:t>
             </a:fld>
             <a:endParaRPr lang="de-CH"/>
           </a:p>
@@ -1781,7 +1781,7 @@
           <a:p>
             <a:fld id="{72079F36-2327-43E4-B4FA-2AA4C52F31C5}" type="datetimeFigureOut">
               <a:rPr lang="de-CH" smtClean="0"/>
-              <a:t>01.11.2022</a:t>
+              <a:t>08.11.2022</a:t>
             </a:fld>
             <a:endParaRPr lang="de-CH"/>
           </a:p>
@@ -2049,7 +2049,7 @@
           <a:p>
             <a:fld id="{72079F36-2327-43E4-B4FA-2AA4C52F31C5}" type="datetimeFigureOut">
               <a:rPr lang="de-CH" smtClean="0"/>
-              <a:t>01.11.2022</a:t>
+              <a:t>08.11.2022</a:t>
             </a:fld>
             <a:endParaRPr lang="de-CH"/>
           </a:p>
@@ -2464,7 +2464,7 @@
           <a:p>
             <a:fld id="{72079F36-2327-43E4-B4FA-2AA4C52F31C5}" type="datetimeFigureOut">
               <a:rPr lang="de-CH" smtClean="0"/>
-              <a:t>01.11.2022</a:t>
+              <a:t>08.11.2022</a:t>
             </a:fld>
             <a:endParaRPr lang="de-CH"/>
           </a:p>
@@ -2606,7 +2606,7 @@
           <a:p>
             <a:fld id="{72079F36-2327-43E4-B4FA-2AA4C52F31C5}" type="datetimeFigureOut">
               <a:rPr lang="de-CH" smtClean="0"/>
-              <a:t>01.11.2022</a:t>
+              <a:t>08.11.2022</a:t>
             </a:fld>
             <a:endParaRPr lang="de-CH"/>
           </a:p>
@@ -2719,7 +2719,7 @@
           <a:p>
             <a:fld id="{72079F36-2327-43E4-B4FA-2AA4C52F31C5}" type="datetimeFigureOut">
               <a:rPr lang="de-CH" smtClean="0"/>
-              <a:t>01.11.2022</a:t>
+              <a:t>08.11.2022</a:t>
             </a:fld>
             <a:endParaRPr lang="de-CH"/>
           </a:p>
@@ -3032,7 +3032,7 @@
           <a:p>
             <a:fld id="{72079F36-2327-43E4-B4FA-2AA4C52F31C5}" type="datetimeFigureOut">
               <a:rPr lang="de-CH" smtClean="0"/>
-              <a:t>01.11.2022</a:t>
+              <a:t>08.11.2022</a:t>
             </a:fld>
             <a:endParaRPr lang="de-CH"/>
           </a:p>
@@ -3321,7 +3321,7 @@
           <a:p>
             <a:fld id="{72079F36-2327-43E4-B4FA-2AA4C52F31C5}" type="datetimeFigureOut">
               <a:rPr lang="de-CH" smtClean="0"/>
-              <a:t>01.11.2022</a:t>
+              <a:t>08.11.2022</a:t>
             </a:fld>
             <a:endParaRPr lang="de-CH"/>
           </a:p>
@@ -3616,7 +3616,7 @@
             <a:fld id="{72079F36-2327-43E4-B4FA-2AA4C52F31C5}" type="datetimeFigureOut">
               <a:rPr lang="de-CH" smtClean="0"/>
               <a:pPr/>
-              <a:t>01.11.2022</a:t>
+              <a:t>08.11.2022</a:t>
             </a:fld>
             <a:endParaRPr lang="de-CH"/>
           </a:p>

</xml_diff>